<commit_message>
favicon, alternative OK pour un mot seul
</commit_message>
<xml_diff>
--- a/docs/logo.pptx
+++ b/docs/logo.pptx
@@ -3169,7 +3169,7 @@
             <a:r>
               <a:rPr lang="fr-FR" sz="1800" b="1" i="1" dirty="0" err="1" smtClean="0">
                 <a:solidFill>
-                  <a:srgbClr val="FF0000"/>
+                  <a:srgbClr val="FFC000"/>
                 </a:solidFill>
               </a:rPr>
               <a:t>.</a:t>
@@ -3206,6 +3206,264 @@
           </a:p>
         </p:txBody>
       </p:sp>
+      <p:sp>
+        <p:nvSpPr>
+          <p:cNvPr id="5" name="Titre 1"/>
+          <p:cNvSpPr txBox="1">
+            <a:spLocks/>
+          </p:cNvSpPr>
+          <p:nvPr/>
+        </p:nvSpPr>
+        <p:spPr>
+          <a:xfrm>
+            <a:off x="3077834" y="1412775"/>
+            <a:ext cx="972108" cy="470309"/>
+          </a:xfrm>
+          <a:prstGeom prst="rect">
+            <a:avLst/>
+          </a:prstGeom>
+        </p:spPr>
+        <p:txBody>
+          <a:bodyPr vert="horz" lIns="91440" tIns="45720" rIns="91440" bIns="45720" rtlCol="0" anchor="ctr">
+            <a:normAutofit fontScale="67500" lnSpcReduction="20000"/>
+          </a:bodyPr>
+          <a:lstStyle>
+            <a:lvl1pPr algn="ctr" defTabSz="914400" rtl="0" eaLnBrk="1" latinLnBrk="0" hangingPunct="1">
+              <a:spcBef>
+                <a:spcPct val="0"/>
+              </a:spcBef>
+              <a:buNone/>
+              <a:defRPr sz="4400" kern="1200">
+                <a:solidFill>
+                  <a:schemeClr val="tx1"/>
+                </a:solidFill>
+                <a:latin typeface="+mj-lt"/>
+                <a:ea typeface="+mj-ea"/>
+                <a:cs typeface="+mj-cs"/>
+              </a:defRPr>
+            </a:lvl1pPr>
+          </a:lstStyle>
+          <a:p>
+            <a:r>
+              <a:rPr lang="fr-FR" b="1" i="1" dirty="0" smtClean="0">
+                <a:solidFill>
+                  <a:srgbClr val="FFC000"/>
+                </a:solidFill>
+              </a:rPr>
+              <a:t>.</a:t>
+            </a:r>
+            <a:r>
+              <a:rPr lang="fr-FR" b="1" i="1" dirty="0" err="1" smtClean="0">
+                <a:solidFill>
+                  <a:srgbClr val="0070C0"/>
+                </a:solidFill>
+              </a:rPr>
+              <a:t>x</a:t>
+            </a:r>
+            <a:r>
+              <a:rPr lang="fr-FR" b="1" i="1" dirty="0" err="1" smtClean="0">
+                <a:solidFill>
+                  <a:srgbClr val="00B050"/>
+                </a:solidFill>
+              </a:rPr>
+              <a:t>y</a:t>
+            </a:r>
+            <a:r>
+              <a:rPr lang="fr-FR" b="1" i="1" dirty="0" err="1" smtClean="0">
+                <a:solidFill>
+                  <a:srgbClr val="FF0000"/>
+                </a:solidFill>
+              </a:rPr>
+              <a:t>z</a:t>
+            </a:r>
+            <a:endParaRPr lang="fr-FR" b="1" i="1" dirty="0">
+              <a:solidFill>
+                <a:srgbClr val="FF0000"/>
+              </a:solidFill>
+            </a:endParaRPr>
+          </a:p>
+        </p:txBody>
+      </p:sp>
+      <p:grpSp>
+        <p:nvGrpSpPr>
+          <p:cNvPr id="9" name="Groupe 8"/>
+          <p:cNvGrpSpPr/>
+          <p:nvPr/>
+        </p:nvGrpSpPr>
+        <p:grpSpPr>
+          <a:xfrm>
+            <a:off x="107504" y="404664"/>
+            <a:ext cx="1643627" cy="1491527"/>
+            <a:chOff x="107504" y="404664"/>
+            <a:chExt cx="1643627" cy="1491527"/>
+          </a:xfrm>
+        </p:grpSpPr>
+        <p:sp>
+          <p:nvSpPr>
+            <p:cNvPr id="6" name="Titre 1"/>
+            <p:cNvSpPr txBox="1">
+              <a:spLocks/>
+            </p:cNvSpPr>
+            <p:nvPr/>
+          </p:nvSpPr>
+          <p:spPr>
+            <a:xfrm>
+              <a:off x="107504" y="457542"/>
+              <a:ext cx="1296144" cy="1171258"/>
+            </a:xfrm>
+            <a:prstGeom prst="rect">
+              <a:avLst/>
+            </a:prstGeom>
+          </p:spPr>
+          <p:txBody>
+            <a:bodyPr vert="horz" lIns="91440" tIns="45720" rIns="91440" bIns="45720" rtlCol="0" anchor="ctr">
+              <a:normAutofit fontScale="97500"/>
+            </a:bodyPr>
+            <a:lstStyle>
+              <a:lvl1pPr algn="ctr" defTabSz="914400" rtl="0" eaLnBrk="1" latinLnBrk="0" hangingPunct="1">
+                <a:spcBef>
+                  <a:spcPct val="0"/>
+                </a:spcBef>
+                <a:buNone/>
+                <a:defRPr sz="4400" kern="1200">
+                  <a:solidFill>
+                    <a:schemeClr val="tx1"/>
+                  </a:solidFill>
+                  <a:latin typeface="+mj-lt"/>
+                  <a:ea typeface="+mj-ea"/>
+                  <a:cs typeface="+mj-cs"/>
+                </a:defRPr>
+              </a:lvl1pPr>
+            </a:lstStyle>
+            <a:p>
+              <a:r>
+                <a:rPr lang="fr-FR" b="1" i="1" dirty="0" smtClean="0">
+                  <a:solidFill>
+                    <a:srgbClr val="00B050"/>
+                  </a:solidFill>
+                </a:rPr>
+                <a:t>y</a:t>
+              </a:r>
+              <a:endParaRPr lang="fr-FR" b="1" i="1" dirty="0">
+                <a:solidFill>
+                  <a:srgbClr val="FF0000"/>
+                </a:solidFill>
+              </a:endParaRPr>
+            </a:p>
+          </p:txBody>
+        </p:sp>
+        <p:sp>
+          <p:nvSpPr>
+            <p:cNvPr id="7" name="Titre 1"/>
+            <p:cNvSpPr txBox="1">
+              <a:spLocks/>
+            </p:cNvSpPr>
+            <p:nvPr/>
+          </p:nvSpPr>
+          <p:spPr>
+            <a:xfrm>
+              <a:off x="454987" y="404664"/>
+              <a:ext cx="1296144" cy="1171258"/>
+            </a:xfrm>
+            <a:prstGeom prst="rect">
+              <a:avLst/>
+            </a:prstGeom>
+          </p:spPr>
+          <p:txBody>
+            <a:bodyPr vert="horz" lIns="91440" tIns="45720" rIns="91440" bIns="45720" rtlCol="0" anchor="ctr">
+              <a:normAutofit fontScale="97500"/>
+            </a:bodyPr>
+            <a:lstStyle>
+              <a:lvl1pPr algn="ctr" defTabSz="914400" rtl="0" eaLnBrk="1" latinLnBrk="0" hangingPunct="1">
+                <a:spcBef>
+                  <a:spcPct val="0"/>
+                </a:spcBef>
+                <a:buNone/>
+                <a:defRPr sz="4400" kern="1200">
+                  <a:solidFill>
+                    <a:schemeClr val="tx1"/>
+                  </a:solidFill>
+                  <a:latin typeface="+mj-lt"/>
+                  <a:ea typeface="+mj-ea"/>
+                  <a:cs typeface="+mj-cs"/>
+                </a:defRPr>
+              </a:lvl1pPr>
+            </a:lstStyle>
+            <a:p>
+              <a:r>
+                <a:rPr lang="fr-FR" b="1" i="1" dirty="0" smtClean="0">
+                  <a:solidFill>
+                    <a:srgbClr val="FFC000"/>
+                  </a:solidFill>
+                </a:rPr>
+                <a:t>.</a:t>
+              </a:r>
+              <a:r>
+                <a:rPr lang="fr-FR" b="1" i="1" dirty="0" smtClean="0">
+                  <a:solidFill>
+                    <a:srgbClr val="0070C0"/>
+                  </a:solidFill>
+                </a:rPr>
+                <a:t>x</a:t>
+              </a:r>
+            </a:p>
+          </p:txBody>
+        </p:sp>
+        <p:sp>
+          <p:nvSpPr>
+            <p:cNvPr id="8" name="Titre 1"/>
+            <p:cNvSpPr txBox="1">
+              <a:spLocks/>
+            </p:cNvSpPr>
+            <p:nvPr/>
+          </p:nvSpPr>
+          <p:spPr>
+            <a:xfrm>
+              <a:off x="251520" y="724933"/>
+              <a:ext cx="1296144" cy="1171258"/>
+            </a:xfrm>
+            <a:prstGeom prst="rect">
+              <a:avLst/>
+            </a:prstGeom>
+          </p:spPr>
+          <p:txBody>
+            <a:bodyPr vert="horz" lIns="91440" tIns="45720" rIns="91440" bIns="45720" rtlCol="0" anchor="ctr">
+              <a:normAutofit fontScale="97500"/>
+            </a:bodyPr>
+            <a:lstStyle>
+              <a:lvl1pPr algn="ctr" defTabSz="914400" rtl="0" eaLnBrk="1" latinLnBrk="0" hangingPunct="1">
+                <a:spcBef>
+                  <a:spcPct val="0"/>
+                </a:spcBef>
+                <a:buNone/>
+                <a:defRPr sz="4400" kern="1200">
+                  <a:solidFill>
+                    <a:schemeClr val="tx1"/>
+                  </a:solidFill>
+                  <a:latin typeface="+mj-lt"/>
+                  <a:ea typeface="+mj-ea"/>
+                  <a:cs typeface="+mj-cs"/>
+                </a:defRPr>
+              </a:lvl1pPr>
+            </a:lstStyle>
+            <a:p>
+              <a:r>
+                <a:rPr lang="fr-FR" b="1" i="1" dirty="0" smtClean="0">
+                  <a:solidFill>
+                    <a:srgbClr val="FF0000"/>
+                  </a:solidFill>
+                </a:rPr>
+                <a:t>z</a:t>
+              </a:r>
+              <a:endParaRPr lang="fr-FR" b="1" i="1" dirty="0">
+                <a:solidFill>
+                  <a:srgbClr val="FF0000"/>
+                </a:solidFill>
+              </a:endParaRPr>
+            </a:p>
+          </p:txBody>
+        </p:sp>
+      </p:grpSp>
     </p:spTree>
     <p:extLst>
       <p:ext uri="{BB962C8B-B14F-4D97-AF65-F5344CB8AC3E}">

</xml_diff>

<commit_message>
indus du transformer début avec pages wiki années
</commit_message>
<xml_diff>
--- a/docs/logo.pptx
+++ b/docs/logo.pptx
@@ -6,6 +6,7 @@
   </p:sldMasterIdLst>
   <p:sldIdLst>
     <p:sldId id="256" r:id="rId2"/>
+    <p:sldId id="257" r:id="rId3"/>
   </p:sldIdLst>
   <p:sldSz cx="9144000" cy="6858000" type="screen4x3"/>
   <p:notesSz cx="6858000" cy="9144000"/>
@@ -288,7 +289,7 @@
           <a:p>
             <a:fld id="{AA309A6D-C09C-4548-B29A-6CF363A7E532}" type="datetimeFigureOut">
               <a:rPr lang="fr-FR" smtClean="0"/>
-              <a:t>17/01/2016</a:t>
+              <a:t>11/02/2016</a:t>
             </a:fld>
             <a:endParaRPr lang="fr-BE"/>
           </a:p>
@@ -453,7 +454,7 @@
           <a:p>
             <a:fld id="{AA309A6D-C09C-4548-B29A-6CF363A7E532}" type="datetimeFigureOut">
               <a:rPr lang="fr-FR" smtClean="0"/>
-              <a:t>17/01/2016</a:t>
+              <a:t>11/02/2016</a:t>
             </a:fld>
             <a:endParaRPr lang="fr-BE"/>
           </a:p>
@@ -628,7 +629,7 @@
           <a:p>
             <a:fld id="{AA309A6D-C09C-4548-B29A-6CF363A7E532}" type="datetimeFigureOut">
               <a:rPr lang="fr-FR" smtClean="0"/>
-              <a:t>17/01/2016</a:t>
+              <a:t>11/02/2016</a:t>
             </a:fld>
             <a:endParaRPr lang="fr-BE"/>
           </a:p>
@@ -793,7 +794,7 @@
           <a:p>
             <a:fld id="{AA309A6D-C09C-4548-B29A-6CF363A7E532}" type="datetimeFigureOut">
               <a:rPr lang="fr-FR" smtClean="0"/>
-              <a:t>17/01/2016</a:t>
+              <a:t>11/02/2016</a:t>
             </a:fld>
             <a:endParaRPr lang="fr-BE"/>
           </a:p>
@@ -1034,7 +1035,7 @@
           <a:p>
             <a:fld id="{AA309A6D-C09C-4548-B29A-6CF363A7E532}" type="datetimeFigureOut">
               <a:rPr lang="fr-FR" smtClean="0"/>
-              <a:t>17/01/2016</a:t>
+              <a:t>11/02/2016</a:t>
             </a:fld>
             <a:endParaRPr lang="fr-BE"/>
           </a:p>
@@ -1317,7 +1318,7 @@
           <a:p>
             <a:fld id="{AA309A6D-C09C-4548-B29A-6CF363A7E532}" type="datetimeFigureOut">
               <a:rPr lang="fr-FR" smtClean="0"/>
-              <a:t>17/01/2016</a:t>
+              <a:t>11/02/2016</a:t>
             </a:fld>
             <a:endParaRPr lang="fr-BE"/>
           </a:p>
@@ -1734,7 +1735,7 @@
           <a:p>
             <a:fld id="{AA309A6D-C09C-4548-B29A-6CF363A7E532}" type="datetimeFigureOut">
               <a:rPr lang="fr-FR" smtClean="0"/>
-              <a:t>17/01/2016</a:t>
+              <a:t>11/02/2016</a:t>
             </a:fld>
             <a:endParaRPr lang="fr-BE"/>
           </a:p>
@@ -1847,7 +1848,7 @@
           <a:p>
             <a:fld id="{AA309A6D-C09C-4548-B29A-6CF363A7E532}" type="datetimeFigureOut">
               <a:rPr lang="fr-FR" smtClean="0"/>
-              <a:t>17/01/2016</a:t>
+              <a:t>11/02/2016</a:t>
             </a:fld>
             <a:endParaRPr lang="fr-BE"/>
           </a:p>
@@ -1937,7 +1938,7 @@
           <a:p>
             <a:fld id="{AA309A6D-C09C-4548-B29A-6CF363A7E532}" type="datetimeFigureOut">
               <a:rPr lang="fr-FR" smtClean="0"/>
-              <a:t>17/01/2016</a:t>
+              <a:t>11/02/2016</a:t>
             </a:fld>
             <a:endParaRPr lang="fr-BE"/>
           </a:p>
@@ -2209,7 +2210,7 @@
           <a:p>
             <a:fld id="{AA309A6D-C09C-4548-B29A-6CF363A7E532}" type="datetimeFigureOut">
               <a:rPr lang="fr-FR" smtClean="0"/>
-              <a:t>17/01/2016</a:t>
+              <a:t>11/02/2016</a:t>
             </a:fld>
             <a:endParaRPr lang="fr-BE"/>
           </a:p>
@@ -2457,7 +2458,7 @@
           <a:p>
             <a:fld id="{AA309A6D-C09C-4548-B29A-6CF363A7E532}" type="datetimeFigureOut">
               <a:rPr lang="fr-FR" smtClean="0"/>
-              <a:t>17/01/2016</a:t>
+              <a:t>11/02/2016</a:t>
             </a:fld>
             <a:endParaRPr lang="fr-BE"/>
           </a:p>
@@ -2665,7 +2666,7 @@
           <a:p>
             <a:fld id="{AA309A6D-C09C-4548-B29A-6CF363A7E532}" type="datetimeFigureOut">
               <a:rPr lang="fr-FR" smtClean="0"/>
-              <a:t>17/01/2016</a:t>
+              <a:t>11/02/2016</a:t>
             </a:fld>
             <a:endParaRPr lang="fr-BE"/>
           </a:p>
@@ -3103,109 +3104,179 @@
           </a:p>
         </p:txBody>
       </p:sp>
-      <p:sp>
-        <p:nvSpPr>
-          <p:cNvPr id="3" name="Sous-titre 2"/>
-          <p:cNvSpPr>
-            <a:spLocks noGrp="1"/>
-          </p:cNvSpPr>
-          <p:nvPr>
-            <p:ph type="subTitle" idx="1"/>
-          </p:nvPr>
-        </p:nvSpPr>
-        <p:spPr/>
-        <p:txBody>
-          <a:bodyPr/>
-          <a:lstStyle/>
-          <a:p>
-            <a:endParaRPr lang="fr-FR"/>
-          </a:p>
-        </p:txBody>
-      </p:sp>
-      <p:sp>
-        <p:nvSpPr>
-          <p:cNvPr id="4" name="Titre 1"/>
-          <p:cNvSpPr txBox="1">
-            <a:spLocks/>
-          </p:cNvSpPr>
+      <p:grpSp>
+        <p:nvGrpSpPr>
+          <p:cNvPr id="10" name="Groupe 9"/>
+          <p:cNvGrpSpPr/>
           <p:nvPr/>
-        </p:nvSpPr>
-        <p:spPr>
+        </p:nvGrpSpPr>
+        <p:grpSpPr>
           <a:xfrm>
-            <a:off x="3563888" y="2420888"/>
-            <a:ext cx="2232248" cy="792087"/>
+            <a:off x="-616986" y="1153319"/>
+            <a:ext cx="14171871" cy="5488555"/>
+            <a:chOff x="-616986" y="1153319"/>
+            <a:chExt cx="14171871" cy="5488555"/>
           </a:xfrm>
-          <a:prstGeom prst="rect">
-            <a:avLst/>
-          </a:prstGeom>
-        </p:spPr>
-        <p:txBody>
-          <a:bodyPr vert="horz" lIns="91440" tIns="45720" rIns="91440" bIns="45720" rtlCol="0" anchor="ctr">
-            <a:normAutofit fontScale="97500"/>
-          </a:bodyPr>
-          <a:lstStyle>
-            <a:lvl1pPr algn="ctr" defTabSz="914400" rtl="0" eaLnBrk="1" latinLnBrk="0" hangingPunct="1">
-              <a:spcBef>
-                <a:spcPct val="0"/>
-              </a:spcBef>
-              <a:buNone/>
-              <a:defRPr sz="4400" kern="1200">
-                <a:solidFill>
-                  <a:schemeClr val="tx1"/>
-                </a:solidFill>
-                <a:latin typeface="+mj-lt"/>
-                <a:ea typeface="+mj-ea"/>
-                <a:cs typeface="+mj-cs"/>
-              </a:defRPr>
-            </a:lvl1pPr>
-          </a:lstStyle>
-          <a:p>
-            <a:r>
-              <a:rPr lang="fr-FR" sz="2400" b="1" dirty="0" err="1" smtClean="0">
-                <a:latin typeface="Lucida Console" pitchFamily="49" charset="0"/>
-              </a:rPr>
-              <a:t>Histoires</a:t>
-            </a:r>
-            <a:r>
-              <a:rPr lang="fr-FR" sz="1800" b="1" i="1" dirty="0" err="1" smtClean="0">
-                <a:solidFill>
-                  <a:srgbClr val="FFC000"/>
-                </a:solidFill>
-              </a:rPr>
-              <a:t>.</a:t>
-            </a:r>
-            <a:r>
-              <a:rPr lang="fr-FR" sz="1800" b="1" i="1" dirty="0" err="1" smtClean="0">
-                <a:solidFill>
-                  <a:srgbClr val="0070C0"/>
-                </a:solidFill>
-              </a:rPr>
-              <a:t>x</a:t>
-            </a:r>
-            <a:r>
-              <a:rPr lang="fr-FR" sz="1800" b="1" i="1" dirty="0" err="1" smtClean="0">
-                <a:solidFill>
-                  <a:srgbClr val="00B050"/>
-                </a:solidFill>
-              </a:rPr>
-              <a:t>y</a:t>
-            </a:r>
-            <a:r>
-              <a:rPr lang="fr-FR" sz="1800" b="1" i="1" dirty="0" err="1" smtClean="0">
+        </p:grpSpPr>
+        <p:pic>
+          <p:nvPicPr>
+            <p:cNvPr id="1026" name="Picture 2"/>
+            <p:cNvPicPr>
+              <a:picLocks noChangeAspect="1" noChangeArrowheads="1"/>
+            </p:cNvPicPr>
+            <p:nvPr/>
+          </p:nvPicPr>
+          <p:blipFill rotWithShape="1">
+            <a:blip r:embed="rId2">
+              <a:extLst>
+                <a:ext uri="{BEBA8EAE-BF5A-486C-A8C5-ECC9F3942E4B}">
+                  <a14:imgProps xmlns:a14="http://schemas.microsoft.com/office/drawing/2010/main">
+                    <a14:imgLayer r:embed="rId3">
+                      <a14:imgEffect>
+                        <a14:sharpenSoften amount="-13000"/>
+                      </a14:imgEffect>
+                      <a14:imgEffect>
+                        <a14:brightnessContrast bright="20000" contrast="-20000"/>
+                      </a14:imgEffect>
+                    </a14:imgLayer>
+                  </a14:imgProps>
+                </a:ext>
+                <a:ext uri="{28A0092B-C50C-407E-A947-70E740481C1C}">
+                  <a14:useLocalDpi xmlns:a14="http://schemas.microsoft.com/office/drawing/2010/main" val="0"/>
+                </a:ext>
+              </a:extLst>
+            </a:blip>
+            <a:srcRect l="12" t="17789" r="6997" b="18186"/>
+            <a:stretch/>
+          </p:blipFill>
+          <p:spPr bwMode="auto">
+            <a:xfrm rot="828356">
+              <a:off x="-616986" y="1153319"/>
+              <a:ext cx="14171871" cy="5488555"/>
+            </a:xfrm>
+            <a:prstGeom prst="rect">
+              <a:avLst/>
+            </a:prstGeom>
+            <a:noFill/>
+            <a:ln>
+              <a:noFill/>
+            </a:ln>
+            <a:effectLst/>
+            <a:extLst>
+              <a:ext uri="{909E8E84-426E-40DD-AFC4-6F175D3DCCD1}">
+                <a14:hiddenFill xmlns:a14="http://schemas.microsoft.com/office/drawing/2010/main">
+                  <a:solidFill>
+                    <a:schemeClr val="accent1"/>
+                  </a:solidFill>
+                </a14:hiddenFill>
+              </a:ext>
+              <a:ext uri="{91240B29-F687-4F45-9708-019B960494DF}">
+                <a14:hiddenLine xmlns:a14="http://schemas.microsoft.com/office/drawing/2010/main" w="9525">
+                  <a:solidFill>
+                    <a:schemeClr val="tx1"/>
+                  </a:solidFill>
+                  <a:miter lim="800000"/>
+                  <a:headEnd/>
+                  <a:tailEnd/>
+                </a14:hiddenLine>
+              </a:ext>
+              <a:ext uri="{AF507438-7753-43E0-B8FC-AC1667EBCBE1}">
+                <a14:hiddenEffects xmlns:a14="http://schemas.microsoft.com/office/drawing/2010/main">
+                  <a:effectLst>
+                    <a:outerShdw dist="35921" dir="2700000" algn="ctr" rotWithShape="0">
+                      <a:schemeClr val="bg2"/>
+                    </a:outerShdw>
+                  </a:effectLst>
+                </a14:hiddenEffects>
+              </a:ext>
+            </a:extLst>
+          </p:spPr>
+        </p:pic>
+        <p:sp>
+          <p:nvSpPr>
+            <p:cNvPr id="4" name="Titre 1"/>
+            <p:cNvSpPr txBox="1">
+              <a:spLocks/>
+            </p:cNvSpPr>
+            <p:nvPr/>
+          </p:nvSpPr>
+          <p:spPr>
+            <a:xfrm>
+              <a:off x="2411760" y="2348880"/>
+              <a:ext cx="6264696" cy="1224136"/>
+            </a:xfrm>
+            <a:prstGeom prst="rect">
+              <a:avLst/>
+            </a:prstGeom>
+          </p:spPr>
+          <p:txBody>
+            <a:bodyPr vert="horz" lIns="91440" tIns="45720" rIns="91440" bIns="45720" rtlCol="0" anchor="ctr">
+              <a:normAutofit fontScale="97500"/>
+            </a:bodyPr>
+            <a:lstStyle>
+              <a:lvl1pPr algn="ctr" defTabSz="914400" rtl="0" eaLnBrk="1" latinLnBrk="0" hangingPunct="1">
+                <a:spcBef>
+                  <a:spcPct val="0"/>
+                </a:spcBef>
+                <a:buNone/>
+                <a:defRPr sz="4400" kern="1200">
+                  <a:solidFill>
+                    <a:schemeClr val="tx1"/>
+                  </a:solidFill>
+                  <a:latin typeface="+mj-lt"/>
+                  <a:ea typeface="+mj-ea"/>
+                  <a:cs typeface="+mj-cs"/>
+                </a:defRPr>
+              </a:lvl1pPr>
+            </a:lstStyle>
+            <a:p>
+              <a:r>
+                <a:rPr lang="fr-FR" sz="4700" b="1" dirty="0" err="1" smtClean="0">
+                  <a:latin typeface="Lucida Console" pitchFamily="49" charset="0"/>
+                </a:rPr>
+                <a:t>Histoires</a:t>
+              </a:r>
+              <a:r>
+                <a:rPr lang="fr-FR" sz="3700" b="1" i="1" dirty="0" err="1" smtClean="0">
+                  <a:solidFill>
+                    <a:srgbClr val="FFC000"/>
+                  </a:solidFill>
+                </a:rPr>
+                <a:t>.</a:t>
+              </a:r>
+              <a:r>
+                <a:rPr lang="fr-FR" sz="3700" b="1" i="1" dirty="0" err="1" smtClean="0">
+                  <a:solidFill>
+                    <a:srgbClr val="0070C0"/>
+                  </a:solidFill>
+                </a:rPr>
+                <a:t>x</a:t>
+              </a:r>
+              <a:r>
+                <a:rPr lang="fr-FR" sz="3700" b="1" i="1" dirty="0" err="1" smtClean="0">
+                  <a:solidFill>
+                    <a:srgbClr val="00B050"/>
+                  </a:solidFill>
+                </a:rPr>
+                <a:t>y</a:t>
+              </a:r>
+              <a:r>
+                <a:rPr lang="fr-FR" sz="3700" b="1" i="1" dirty="0" err="1" smtClean="0">
+                  <a:solidFill>
+                    <a:srgbClr val="FF0000"/>
+                  </a:solidFill>
+                </a:rPr>
+                <a:t>z</a:t>
+              </a:r>
+              <a:endParaRPr lang="fr-FR" sz="3700" b="1" i="1" dirty="0">
                 <a:solidFill>
                   <a:srgbClr val="FF0000"/>
                 </a:solidFill>
-              </a:rPr>
-              <a:t>z</a:t>
-            </a:r>
-            <a:endParaRPr lang="fr-FR" sz="1800" b="1" i="1" dirty="0">
-              <a:solidFill>
-                <a:srgbClr val="FF0000"/>
-              </a:solidFill>
-            </a:endParaRPr>
-          </a:p>
-        </p:txBody>
-      </p:sp>
+              </a:endParaRPr>
+            </a:p>
+          </p:txBody>
+        </p:sp>
+      </p:grpSp>
       <p:sp>
         <p:nvSpPr>
           <p:cNvPr id="5" name="Titre 1"/>
@@ -3468,6 +3539,113 @@
     <p:extLst>
       <p:ext uri="{BB962C8B-B14F-4D97-AF65-F5344CB8AC3E}">
         <p14:creationId xmlns:p14="http://schemas.microsoft.com/office/powerpoint/2010/main" val="1630019299"/>
+      </p:ext>
+    </p:extLst>
+  </p:cSld>
+  <p:clrMapOvr>
+    <a:masterClrMapping/>
+  </p:clrMapOvr>
+</p:sld>
+</file>
+
+<file path=ppt/slides/slide2.xml><?xml version="1.0" encoding="utf-8"?>
+<p:sld xmlns:a="http://schemas.openxmlformats.org/drawingml/2006/main" xmlns:r="http://schemas.openxmlformats.org/officeDocument/2006/relationships" xmlns:p="http://schemas.openxmlformats.org/presentationml/2006/main">
+  <p:cSld>
+    <p:spTree>
+      <p:nvGrpSpPr>
+        <p:cNvPr id="1" name=""/>
+        <p:cNvGrpSpPr/>
+        <p:nvPr/>
+      </p:nvGrpSpPr>
+      <p:grpSpPr>
+        <a:xfrm>
+          <a:off x="0" y="0"/>
+          <a:ext cx="0" cy="0"/>
+          <a:chOff x="0" y="0"/>
+          <a:chExt cx="0" cy="0"/>
+        </a:xfrm>
+      </p:grpSpPr>
+      <p:sp>
+        <p:nvSpPr>
+          <p:cNvPr id="2" name="Titre 1"/>
+          <p:cNvSpPr>
+            <a:spLocks noGrp="1"/>
+          </p:cNvSpPr>
+          <p:nvPr>
+            <p:ph type="title"/>
+          </p:nvPr>
+        </p:nvSpPr>
+        <p:spPr/>
+        <p:txBody>
+          <a:bodyPr/>
+          <a:lstStyle/>
+          <a:p>
+            <a:endParaRPr lang="fr-FR"/>
+          </a:p>
+        </p:txBody>
+      </p:sp>
+      <p:sp>
+        <p:nvSpPr>
+          <p:cNvPr id="3" name="Espace réservé du contenu 2"/>
+          <p:cNvSpPr>
+            <a:spLocks noGrp="1"/>
+          </p:cNvSpPr>
+          <p:nvPr>
+            <p:ph idx="1"/>
+          </p:nvPr>
+        </p:nvSpPr>
+        <p:spPr/>
+        <p:txBody>
+          <a:bodyPr/>
+          <a:lstStyle/>
+          <a:p>
+            <a:endParaRPr lang="fr-FR"/>
+          </a:p>
+        </p:txBody>
+      </p:sp>
+      <p:pic>
+        <p:nvPicPr>
+          <p:cNvPr id="4" name="Picture 3" descr="C:\Users\slim\Desktop\logo2.png"/>
+          <p:cNvPicPr>
+            <a:picLocks noChangeAspect="1" noChangeArrowheads="1"/>
+          </p:cNvPicPr>
+          <p:nvPr/>
+        </p:nvPicPr>
+        <p:blipFill rotWithShape="1">
+          <a:blip r:embed="rId2">
+            <a:extLst>
+              <a:ext uri="{28A0092B-C50C-407E-A947-70E740481C1C}">
+                <a14:useLocalDpi xmlns:a14="http://schemas.microsoft.com/office/drawing/2010/main" val="0"/>
+              </a:ext>
+            </a:extLst>
+          </a:blip>
+          <a:srcRect l="14568" t="30909" r="26208" b="44175"/>
+          <a:stretch/>
+        </p:blipFill>
+        <p:spPr bwMode="auto">
+          <a:xfrm>
+            <a:off x="-30719" y="2276872"/>
+            <a:ext cx="8930789" cy="2171863"/>
+          </a:xfrm>
+          <a:prstGeom prst="rect">
+            <a:avLst/>
+          </a:prstGeom>
+          <a:noFill/>
+          <a:extLst>
+            <a:ext uri="{909E8E84-426E-40DD-AFC4-6F175D3DCCD1}">
+              <a14:hiddenFill xmlns:a14="http://schemas.microsoft.com/office/drawing/2010/main">
+                <a:solidFill>
+                  <a:srgbClr val="FFFFFF"/>
+                </a:solidFill>
+              </a14:hiddenFill>
+            </a:ext>
+          </a:extLst>
+        </p:spPr>
+      </p:pic>
+    </p:spTree>
+    <p:extLst>
+      <p:ext uri="{BB962C8B-B14F-4D97-AF65-F5344CB8AC3E}">
+        <p14:creationId xmlns:p14="http://schemas.microsoft.com/office/powerpoint/2010/main" val="1584899090"/>
       </p:ext>
     </p:extLst>
   </p:cSld>

</xml_diff>